<commit_message>
Update architecture diagram and include in README.md
</commit_message>
<xml_diff>
--- a/vault/diagrams/de-knight.pptx
+++ b/vault/diagrams/de-knight.pptx
@@ -10,7 +10,7 @@
   <p:sldIdLst>
     <p:sldId id="349" r:id="rId2"/>
     <p:sldId id="343" r:id="rId3"/>
-    <p:sldId id="348" r:id="rId4"/>
+    <p:sldId id="354" r:id="rId4"/>
     <p:sldId id="350" r:id="rId5"/>
     <p:sldId id="351" r:id="rId6"/>
     <p:sldId id="352" r:id="rId7"/>
@@ -215,7 +215,7 @@
           <a:p>
             <a:fld id="{69A5D272-DB20-45C2-8029-67830D2D94AD}" type="datetimeFigureOut">
               <a:rPr lang="en-US" smtClean="0"/>
-              <a:t>11/15/2022</a:t>
+              <a:t>11/16/2022</a:t>
             </a:fld>
             <a:endParaRPr lang="en-US"/>
           </a:p>
@@ -557,7 +557,7 @@
     </p:spTree>
     <p:extLst>
       <p:ext uri="{BB962C8B-B14F-4D97-AF65-F5344CB8AC3E}">
-        <p14:creationId xmlns:p14="http://schemas.microsoft.com/office/powerpoint/2010/main" val="3348170045"/>
+        <p14:creationId xmlns:p14="http://schemas.microsoft.com/office/powerpoint/2010/main" val="1279198454"/>
       </p:ext>
     </p:extLst>
   </p:cSld>
@@ -698,7 +698,7 @@
           <a:p>
             <a:fld id="{9258AD0A-3636-400E-B0A1-AFAFDD52F5BB}" type="datetimeFigureOut">
               <a:rPr lang="en-US" smtClean="0"/>
-              <a:t>11/15/2022</a:t>
+              <a:t>11/16/2022</a:t>
             </a:fld>
             <a:endParaRPr lang="en-US"/>
           </a:p>
@@ -868,7 +868,7 @@
           <a:p>
             <a:fld id="{9258AD0A-3636-400E-B0A1-AFAFDD52F5BB}" type="datetimeFigureOut">
               <a:rPr lang="en-US" smtClean="0"/>
-              <a:t>11/15/2022</a:t>
+              <a:t>11/16/2022</a:t>
             </a:fld>
             <a:endParaRPr lang="en-US"/>
           </a:p>
@@ -1048,7 +1048,7 @@
           <a:p>
             <a:fld id="{9258AD0A-3636-400E-B0A1-AFAFDD52F5BB}" type="datetimeFigureOut">
               <a:rPr lang="en-US" smtClean="0"/>
-              <a:t>11/15/2022</a:t>
+              <a:t>11/16/2022</a:t>
             </a:fld>
             <a:endParaRPr lang="en-US"/>
           </a:p>
@@ -1218,7 +1218,7 @@
           <a:p>
             <a:fld id="{9258AD0A-3636-400E-B0A1-AFAFDD52F5BB}" type="datetimeFigureOut">
               <a:rPr lang="en-US" smtClean="0"/>
-              <a:t>11/15/2022</a:t>
+              <a:t>11/16/2022</a:t>
             </a:fld>
             <a:endParaRPr lang="en-US"/>
           </a:p>
@@ -1464,7 +1464,7 @@
           <a:p>
             <a:fld id="{9258AD0A-3636-400E-B0A1-AFAFDD52F5BB}" type="datetimeFigureOut">
               <a:rPr lang="en-US" smtClean="0"/>
-              <a:t>11/15/2022</a:t>
+              <a:t>11/16/2022</a:t>
             </a:fld>
             <a:endParaRPr lang="en-US"/>
           </a:p>
@@ -1696,7 +1696,7 @@
           <a:p>
             <a:fld id="{9258AD0A-3636-400E-B0A1-AFAFDD52F5BB}" type="datetimeFigureOut">
               <a:rPr lang="en-US" smtClean="0"/>
-              <a:t>11/15/2022</a:t>
+              <a:t>11/16/2022</a:t>
             </a:fld>
             <a:endParaRPr lang="en-US"/>
           </a:p>
@@ -2063,7 +2063,7 @@
           <a:p>
             <a:fld id="{9258AD0A-3636-400E-B0A1-AFAFDD52F5BB}" type="datetimeFigureOut">
               <a:rPr lang="en-US" smtClean="0"/>
-              <a:t>11/15/2022</a:t>
+              <a:t>11/16/2022</a:t>
             </a:fld>
             <a:endParaRPr lang="en-US"/>
           </a:p>
@@ -2181,7 +2181,7 @@
           <a:p>
             <a:fld id="{9258AD0A-3636-400E-B0A1-AFAFDD52F5BB}" type="datetimeFigureOut">
               <a:rPr lang="en-US" smtClean="0"/>
-              <a:t>11/15/2022</a:t>
+              <a:t>11/16/2022</a:t>
             </a:fld>
             <a:endParaRPr lang="en-US"/>
           </a:p>
@@ -2276,7 +2276,7 @@
           <a:p>
             <a:fld id="{9258AD0A-3636-400E-B0A1-AFAFDD52F5BB}" type="datetimeFigureOut">
               <a:rPr lang="en-US" smtClean="0"/>
-              <a:t>11/15/2022</a:t>
+              <a:t>11/16/2022</a:t>
             </a:fld>
             <a:endParaRPr lang="en-US"/>
           </a:p>
@@ -2553,7 +2553,7 @@
           <a:p>
             <a:fld id="{9258AD0A-3636-400E-B0A1-AFAFDD52F5BB}" type="datetimeFigureOut">
               <a:rPr lang="en-US" smtClean="0"/>
-              <a:t>11/15/2022</a:t>
+              <a:t>11/16/2022</a:t>
             </a:fld>
             <a:endParaRPr lang="en-US"/>
           </a:p>
@@ -2806,7 +2806,7 @@
           <a:p>
             <a:fld id="{9258AD0A-3636-400E-B0A1-AFAFDD52F5BB}" type="datetimeFigureOut">
               <a:rPr lang="en-US" smtClean="0"/>
-              <a:t>11/15/2022</a:t>
+              <a:t>11/16/2022</a:t>
             </a:fld>
             <a:endParaRPr lang="en-US"/>
           </a:p>
@@ -3022,7 +3022,7 @@
           <a:p>
             <a:fld id="{9258AD0A-3636-400E-B0A1-AFAFDD52F5BB}" type="datetimeFigureOut">
               <a:rPr lang="en-US" smtClean="0"/>
-              <a:t>11/15/2022</a:t>
+              <a:t>11/16/2022</a:t>
             </a:fld>
             <a:endParaRPr lang="en-US"/>
           </a:p>
@@ -3651,8 +3651,8 @@
         </p:blipFill>
         <p:spPr>
           <a:xfrm>
-            <a:off x="1954695" y="225222"/>
-            <a:ext cx="8282610" cy="6407556"/>
+            <a:off x="1954695" y="325679"/>
+            <a:ext cx="8282609" cy="6206642"/>
           </a:xfrm>
           <a:prstGeom prst="rect">
             <a:avLst/>
@@ -3662,7 +3662,7 @@
     </p:spTree>
     <p:extLst>
       <p:ext uri="{BB962C8B-B14F-4D97-AF65-F5344CB8AC3E}">
-        <p14:creationId xmlns:p14="http://schemas.microsoft.com/office/powerpoint/2010/main" val="1615060020"/>
+        <p14:creationId xmlns:p14="http://schemas.microsoft.com/office/powerpoint/2010/main" val="2206740348"/>
       </p:ext>
     </p:extLst>
   </p:cSld>

</xml_diff>

<commit_message>
Show json/rpc for communication link in arch. diagram
</commit_message>
<xml_diff>
--- a/vault/diagrams/de-knight.pptx
+++ b/vault/diagrams/de-knight.pptx
@@ -3651,8 +3651,8 @@
         </p:blipFill>
         <p:spPr>
           <a:xfrm>
-            <a:off x="1954695" y="325679"/>
-            <a:ext cx="8282609" cy="6206642"/>
+            <a:off x="1954695" y="462702"/>
+            <a:ext cx="8282609" cy="5932596"/>
           </a:xfrm>
           <a:prstGeom prst="rect">
             <a:avLst/>

</xml_diff>